<commit_message>
Update Aplicație de repartizare a culorilor țărilor de pe.pptx
</commit_message>
<xml_diff>
--- a/Aplicație de repartizare a culorilor țărilor de pe.pptx
+++ b/Aplicație de repartizare a culorilor țărilor de pe.pptx
@@ -1119,8 +1119,8 @@
         <a:p>
           <a:pPr rtl="0"/>
           <a:r>
-            <a:rPr lang="ro"/>
-            <a:t>Activitate 1</a:t>
+            <a:rPr lang="ro" dirty="0"/>
+            <a:t>Preluare țară nouă și introducere în listă.</a:t>
           </a:r>
         </a:p>
       </dgm:t>
@@ -1164,7 +1164,7 @@
           <a:pPr rtl="0"/>
           <a:r>
             <a:rPr lang="ro" dirty="0"/>
-            <a:t>Activitate 2</a:t>
+            <a:t>Verificare prezență țară nouă în lista de vecini a țărilor deja existente/verificare prezenței țărilor existente deja în lista de vecini a noii țări.</a:t>
           </a:r>
         </a:p>
       </dgm:t>
@@ -1227,8 +1227,8 @@
         <a:p>
           <a:pPr rtl="0"/>
           <a:r>
-            <a:rPr lang="ro"/>
-            <a:t>Activitate 3</a:t>
+            <a:rPr lang="ro" dirty="0"/>
+            <a:t>Salvare date într-o structură auxiliară pentru seliarizare.</a:t>
           </a:r>
         </a:p>
       </dgm:t>
@@ -1278,7 +1278,7 @@
       </dgm:prSet>
       <dgm:spPr/>
     </dgm:pt>
-    <dgm:pt modelId="{124EF20B-D98C-45B2-BB13-7B93B5373CEB}" type="pres">
+    <dgm:pt modelId="{220667EB-7A5C-4EA9-99D4-0E30A089AE46}" type="pres">
       <dgm:prSet presAssocID="{CD7942A0-B7D2-4B14-8FEA-55FC702F5BE7}" presName="ThreeNodes_1" presStyleLbl="node1" presStyleIdx="0" presStyleCnt="3">
         <dgm:presLayoutVars>
           <dgm:bulletEnabled val="1"/>
@@ -1286,15 +1286,15 @@
       </dgm:prSet>
       <dgm:spPr/>
     </dgm:pt>
-    <dgm:pt modelId="{CA544AF7-F7B2-4CA5-9251-B4CDB8D06634}" type="pres">
-      <dgm:prSet presAssocID="{CD7942A0-B7D2-4B14-8FEA-55FC702F5BE7}" presName="ThreeNodes_2" presStyleLbl="node1" presStyleIdx="1" presStyleCnt="3">
+    <dgm:pt modelId="{CE8F4615-0112-44D3-A508-ED8F9011EB8A}" type="pres">
+      <dgm:prSet presAssocID="{CD7942A0-B7D2-4B14-8FEA-55FC702F5BE7}" presName="ThreeNodes_2" presStyleLbl="node1" presStyleIdx="1" presStyleCnt="3" custLinFactNeighborX="0" custLinFactNeighborY="1153">
         <dgm:presLayoutVars>
           <dgm:bulletEnabled val="1"/>
         </dgm:presLayoutVars>
       </dgm:prSet>
       <dgm:spPr/>
     </dgm:pt>
-    <dgm:pt modelId="{2AE92D3F-F0FA-45DD-BB60-4C6FBC6BC016}" type="pres">
+    <dgm:pt modelId="{227983A4-7694-4DB2-8ADB-03C8834387D3}" type="pres">
       <dgm:prSet presAssocID="{CD7942A0-B7D2-4B14-8FEA-55FC702F5BE7}" presName="ThreeNodes_3" presStyleLbl="node1" presStyleIdx="2" presStyleCnt="3">
         <dgm:presLayoutVars>
           <dgm:bulletEnabled val="1"/>
@@ -1302,15 +1302,15 @@
       </dgm:prSet>
       <dgm:spPr/>
     </dgm:pt>
-    <dgm:pt modelId="{9CA877D8-99F8-40A0-89E9-59A61C9A70F4}" type="pres">
-      <dgm:prSet presAssocID="{CD7942A0-B7D2-4B14-8FEA-55FC702F5BE7}" presName="ThreeConn_1-2" presStyleLbl="fgAccFollowNode1" presStyleIdx="0" presStyleCnt="2">
+    <dgm:pt modelId="{5C4F53F3-3A5B-4BD7-AD9C-7F581284DC3C}" type="pres">
+      <dgm:prSet presAssocID="{CD7942A0-B7D2-4B14-8FEA-55FC702F5BE7}" presName="ThreeConn_1-2" presStyleLbl="fgAccFollowNode1" presStyleIdx="0" presStyleCnt="2" custLinFactNeighborX="45501" custLinFactNeighborY="-1559">
         <dgm:presLayoutVars>
           <dgm:bulletEnabled val="1"/>
         </dgm:presLayoutVars>
       </dgm:prSet>
       <dgm:spPr/>
     </dgm:pt>
-    <dgm:pt modelId="{62643EF2-016C-41F1-8CBC-398422A85727}" type="pres">
+    <dgm:pt modelId="{4A26986F-8307-4281-968A-DF9182241FA5}" type="pres">
       <dgm:prSet presAssocID="{CD7942A0-B7D2-4B14-8FEA-55FC702F5BE7}" presName="ThreeConn_2-3" presStyleLbl="fgAccFollowNode1" presStyleIdx="1" presStyleCnt="2">
         <dgm:presLayoutVars>
           <dgm:bulletEnabled val="1"/>
@@ -1318,7 +1318,7 @@
       </dgm:prSet>
       <dgm:spPr/>
     </dgm:pt>
-    <dgm:pt modelId="{7A2F6994-DA87-4497-BFC7-DD9D6EC5315F}" type="pres">
+    <dgm:pt modelId="{DC1A69C5-ECD2-4EB2-90CA-135058ED9122}" type="pres">
       <dgm:prSet presAssocID="{CD7942A0-B7D2-4B14-8FEA-55FC702F5BE7}" presName="ThreeNodes_1_text" presStyleLbl="node1" presStyleIdx="2" presStyleCnt="3">
         <dgm:presLayoutVars>
           <dgm:bulletEnabled val="1"/>
@@ -1326,7 +1326,7 @@
       </dgm:prSet>
       <dgm:spPr/>
     </dgm:pt>
-    <dgm:pt modelId="{916C48CB-E452-4B79-A9B9-4C9A90B47960}" type="pres">
+    <dgm:pt modelId="{4FDBBB16-884D-4BFE-98CF-122F318D9E61}" type="pres">
       <dgm:prSet presAssocID="{CD7942A0-B7D2-4B14-8FEA-55FC702F5BE7}" presName="ThreeNodes_2_text" presStyleLbl="node1" presStyleIdx="2" presStyleCnt="3">
         <dgm:presLayoutVars>
           <dgm:bulletEnabled val="1"/>
@@ -1334,7 +1334,7 @@
       </dgm:prSet>
       <dgm:spPr/>
     </dgm:pt>
-    <dgm:pt modelId="{A31D264E-E285-4E5C-8EB7-762CD501BE72}" type="pres">
+    <dgm:pt modelId="{BE4C7D82-E3E5-4516-A397-8CFB32AE9BDF}" type="pres">
       <dgm:prSet presAssocID="{CD7942A0-B7D2-4B14-8FEA-55FC702F5BE7}" presName="ThreeNodes_3_text" presStyleLbl="node1" presStyleIdx="2" presStyleCnt="3">
         <dgm:presLayoutVars>
           <dgm:bulletEnabled val="1"/>
@@ -1344,27 +1344,27 @@
     </dgm:pt>
   </dgm:ptLst>
   <dgm:cxnLst>
-    <dgm:cxn modelId="{5A89A138-BC1A-490F-935E-2EC3F74E8E18}" type="presOf" srcId="{7133ECF5-4190-4604-AA2F-03C9A0A9210F}" destId="{2AE92D3F-F0FA-45DD-BB60-4C6FBC6BC016}" srcOrd="0" destOrd="0" presId="urn:microsoft.com/office/officeart/2005/8/layout/vProcess5"/>
+    <dgm:cxn modelId="{D7760333-6F6C-499D-B265-E197C3954F72}" type="presOf" srcId="{095A5E99-E976-4550-8F80-53CC813F2F5A}" destId="{220667EB-7A5C-4EA9-99D4-0E30A089AE46}" srcOrd="0" destOrd="0" presId="urn:microsoft.com/office/officeart/2005/8/layout/vProcess5"/>
+    <dgm:cxn modelId="{24E42C3B-5847-41FF-B44D-F1CD0E231375}" type="presOf" srcId="{7133ECF5-4190-4604-AA2F-03C9A0A9210F}" destId="{BE4C7D82-E3E5-4516-A397-8CFB32AE9BDF}" srcOrd="1" destOrd="0" presId="urn:microsoft.com/office/officeart/2005/8/layout/vProcess5"/>
+    <dgm:cxn modelId="{9681435E-62BE-4166-83A6-37D451C5E2A7}" type="presOf" srcId="{8EC937D8-BD76-4A12-A3E5-900D5C1E2E05}" destId="{4FDBBB16-884D-4BFE-98CF-122F318D9E61}" srcOrd="1" destOrd="0" presId="urn:microsoft.com/office/officeart/2005/8/layout/vProcess5"/>
     <dgm:cxn modelId="{011A9761-E983-4C7D-AB1D-2038261D8FF8}" srcId="{CD7942A0-B7D2-4B14-8FEA-55FC702F5BE7}" destId="{7133ECF5-4190-4604-AA2F-03C9A0A9210F}" srcOrd="2" destOrd="0" parTransId="{7D1B29D7-21DD-436A-8F7C-E87DE53C1431}" sibTransId="{46037378-034A-4662-877A-B53E1DA069A3}"/>
-    <dgm:cxn modelId="{8A063A46-8F8D-405A-B2D6-6495FA638F46}" type="presOf" srcId="{8EC937D8-BD76-4A12-A3E5-900D5C1E2E05}" destId="{CA544AF7-F7B2-4CA5-9251-B4CDB8D06634}" srcOrd="0" destOrd="0" presId="urn:microsoft.com/office/officeart/2005/8/layout/vProcess5"/>
-    <dgm:cxn modelId="{A071614A-8A85-47B2-A113-0652CAB9B428}" type="presOf" srcId="{095A5E99-E976-4550-8F80-53CC813F2F5A}" destId="{124EF20B-D98C-45B2-BB13-7B93B5373CEB}" srcOrd="0" destOrd="0" presId="urn:microsoft.com/office/officeart/2005/8/layout/vProcess5"/>
     <dgm:cxn modelId="{43DC8383-AEE5-490C-A8E5-1F216F2B8FE6}" srcId="{CD7942A0-B7D2-4B14-8FEA-55FC702F5BE7}" destId="{8EC937D8-BD76-4A12-A3E5-900D5C1E2E05}" srcOrd="1" destOrd="0" parTransId="{8265EE85-9851-494E-A6D3-1CDACE947DF3}" sibTransId="{B3EFD4A5-9FA1-4ABE-B722-05162509509B}"/>
-    <dgm:cxn modelId="{03E7038C-2CC0-496B-88A0-60396CDC31E4}" type="presOf" srcId="{7133ECF5-4190-4604-AA2F-03C9A0A9210F}" destId="{A31D264E-E285-4E5C-8EB7-762CD501BE72}" srcOrd="1" destOrd="0" presId="urn:microsoft.com/office/officeart/2005/8/layout/vProcess5"/>
     <dgm:cxn modelId="{C2D0E194-BD14-4AD2-9E3A-CE984C34B6CD}" type="presOf" srcId="{CD7942A0-B7D2-4B14-8FEA-55FC702F5BE7}" destId="{1D84D8B6-AB32-4491-B5D2-EFE3D7668B88}" srcOrd="0" destOrd="0" presId="urn:microsoft.com/office/officeart/2005/8/layout/vProcess5"/>
-    <dgm:cxn modelId="{BB374C9D-646D-46E6-89B4-117F0E21BA34}" type="presOf" srcId="{8EC937D8-BD76-4A12-A3E5-900D5C1E2E05}" destId="{916C48CB-E452-4B79-A9B9-4C9A90B47960}" srcOrd="1" destOrd="0" presId="urn:microsoft.com/office/officeart/2005/8/layout/vProcess5"/>
-    <dgm:cxn modelId="{12FC7FDE-4033-4970-A683-61DE6FA84E89}" type="presOf" srcId="{8877691F-1B60-4485-9174-DDEC7EE68B70}" destId="{9CA877D8-99F8-40A0-89E9-59A61C9A70F4}" srcOrd="0" destOrd="0" presId="urn:microsoft.com/office/officeart/2005/8/layout/vProcess5"/>
+    <dgm:cxn modelId="{EED8F2AF-2B89-44B4-80DC-CCF6654251E6}" type="presOf" srcId="{8877691F-1B60-4485-9174-DDEC7EE68B70}" destId="{5C4F53F3-3A5B-4BD7-AD9C-7F581284DC3C}" srcOrd="0" destOrd="0" presId="urn:microsoft.com/office/officeart/2005/8/layout/vProcess5"/>
+    <dgm:cxn modelId="{FB59EFC0-067B-47E7-BECA-1C57534F9A9B}" type="presOf" srcId="{B3EFD4A5-9FA1-4ABE-B722-05162509509B}" destId="{4A26986F-8307-4281-968A-DF9182241FA5}" srcOrd="0" destOrd="0" presId="urn:microsoft.com/office/officeart/2005/8/layout/vProcess5"/>
+    <dgm:cxn modelId="{76F833CE-35E1-4A4C-AD0F-4F463182A794}" type="presOf" srcId="{7133ECF5-4190-4604-AA2F-03C9A0A9210F}" destId="{227983A4-7694-4DB2-8ADB-03C8834387D3}" srcOrd="0" destOrd="0" presId="urn:microsoft.com/office/officeart/2005/8/layout/vProcess5"/>
+    <dgm:cxn modelId="{90669ED7-C409-4EA7-AED9-883BCCF0057F}" type="presOf" srcId="{8EC937D8-BD76-4A12-A3E5-900D5C1E2E05}" destId="{CE8F4615-0112-44D3-A508-ED8F9011EB8A}" srcOrd="0" destOrd="0" presId="urn:microsoft.com/office/officeart/2005/8/layout/vProcess5"/>
+    <dgm:cxn modelId="{90DF6CDC-6C1A-4913-9B49-B79C70405D70}" type="presOf" srcId="{095A5E99-E976-4550-8F80-53CC813F2F5A}" destId="{DC1A69C5-ECD2-4EB2-90CA-135058ED9122}" srcOrd="1" destOrd="0" presId="urn:microsoft.com/office/officeart/2005/8/layout/vProcess5"/>
     <dgm:cxn modelId="{D1A4D8E6-F04E-4AB1-8D0C-63DC7AB1E81F}" srcId="{CD7942A0-B7D2-4B14-8FEA-55FC702F5BE7}" destId="{095A5E99-E976-4550-8F80-53CC813F2F5A}" srcOrd="0" destOrd="0" parTransId="{03339A0D-5DC0-4B29-8353-C5AEBFD4DE86}" sibTransId="{8877691F-1B60-4485-9174-DDEC7EE68B70}"/>
-    <dgm:cxn modelId="{7C007CEB-6418-4EA7-9CB6-5B93D0C655E6}" type="presOf" srcId="{095A5E99-E976-4550-8F80-53CC813F2F5A}" destId="{7A2F6994-DA87-4497-BFC7-DD9D6EC5315F}" srcOrd="1" destOrd="0" presId="urn:microsoft.com/office/officeart/2005/8/layout/vProcess5"/>
-    <dgm:cxn modelId="{6CF7D6F9-A5F2-48E3-AF5C-A2074559AE21}" type="presOf" srcId="{B3EFD4A5-9FA1-4ABE-B722-05162509509B}" destId="{62643EF2-016C-41F1-8CBC-398422A85727}" srcOrd="0" destOrd="0" presId="urn:microsoft.com/office/officeart/2005/8/layout/vProcess5"/>
     <dgm:cxn modelId="{768DB908-A4BF-48A6-A740-5DD0CBAFBB11}" type="presParOf" srcId="{1D84D8B6-AB32-4491-B5D2-EFE3D7668B88}" destId="{3E0E8213-E460-4EB7-9A92-C2B1CC553F0D}" srcOrd="0" destOrd="0" presId="urn:microsoft.com/office/officeart/2005/8/layout/vProcess5"/>
-    <dgm:cxn modelId="{A8B17D3B-E670-4FE0-A845-244C702B8151}" type="presParOf" srcId="{1D84D8B6-AB32-4491-B5D2-EFE3D7668B88}" destId="{124EF20B-D98C-45B2-BB13-7B93B5373CEB}" srcOrd="1" destOrd="0" presId="urn:microsoft.com/office/officeart/2005/8/layout/vProcess5"/>
-    <dgm:cxn modelId="{1E8E2D8B-A980-4080-A16E-1F74528DE4D0}" type="presParOf" srcId="{1D84D8B6-AB32-4491-B5D2-EFE3D7668B88}" destId="{CA544AF7-F7B2-4CA5-9251-B4CDB8D06634}" srcOrd="2" destOrd="0" presId="urn:microsoft.com/office/officeart/2005/8/layout/vProcess5"/>
-    <dgm:cxn modelId="{7992440C-9F36-432D-90EE-E2A708CEB38B}" type="presParOf" srcId="{1D84D8B6-AB32-4491-B5D2-EFE3D7668B88}" destId="{2AE92D3F-F0FA-45DD-BB60-4C6FBC6BC016}" srcOrd="3" destOrd="0" presId="urn:microsoft.com/office/officeart/2005/8/layout/vProcess5"/>
-    <dgm:cxn modelId="{DBE883B8-7D13-43BA-A456-8DBB93D30C93}" type="presParOf" srcId="{1D84D8B6-AB32-4491-B5D2-EFE3D7668B88}" destId="{9CA877D8-99F8-40A0-89E9-59A61C9A70F4}" srcOrd="4" destOrd="0" presId="urn:microsoft.com/office/officeart/2005/8/layout/vProcess5"/>
-    <dgm:cxn modelId="{A3B9E6ED-FFD0-430E-B609-EBE8E75E7C44}" type="presParOf" srcId="{1D84D8B6-AB32-4491-B5D2-EFE3D7668B88}" destId="{62643EF2-016C-41F1-8CBC-398422A85727}" srcOrd="5" destOrd="0" presId="urn:microsoft.com/office/officeart/2005/8/layout/vProcess5"/>
-    <dgm:cxn modelId="{278FE748-9C54-4E36-9203-E948DB63C99A}" type="presParOf" srcId="{1D84D8B6-AB32-4491-B5D2-EFE3D7668B88}" destId="{7A2F6994-DA87-4497-BFC7-DD9D6EC5315F}" srcOrd="6" destOrd="0" presId="urn:microsoft.com/office/officeart/2005/8/layout/vProcess5"/>
-    <dgm:cxn modelId="{E81279B5-23BF-4F73-A353-8831FC04E9BC}" type="presParOf" srcId="{1D84D8B6-AB32-4491-B5D2-EFE3D7668B88}" destId="{916C48CB-E452-4B79-A9B9-4C9A90B47960}" srcOrd="7" destOrd="0" presId="urn:microsoft.com/office/officeart/2005/8/layout/vProcess5"/>
-    <dgm:cxn modelId="{16289EC3-0C51-4B32-B6CC-FE8F7F6F6C76}" type="presParOf" srcId="{1D84D8B6-AB32-4491-B5D2-EFE3D7668B88}" destId="{A31D264E-E285-4E5C-8EB7-762CD501BE72}" srcOrd="8" destOrd="0" presId="urn:microsoft.com/office/officeart/2005/8/layout/vProcess5"/>
+    <dgm:cxn modelId="{6CC7E8F8-39E0-41E2-A112-F5F97A98E030}" type="presParOf" srcId="{1D84D8B6-AB32-4491-B5D2-EFE3D7668B88}" destId="{220667EB-7A5C-4EA9-99D4-0E30A089AE46}" srcOrd="1" destOrd="0" presId="urn:microsoft.com/office/officeart/2005/8/layout/vProcess5"/>
+    <dgm:cxn modelId="{77BE0FAC-8BBC-4245-AAAA-9E308D2DCD39}" type="presParOf" srcId="{1D84D8B6-AB32-4491-B5D2-EFE3D7668B88}" destId="{CE8F4615-0112-44D3-A508-ED8F9011EB8A}" srcOrd="2" destOrd="0" presId="urn:microsoft.com/office/officeart/2005/8/layout/vProcess5"/>
+    <dgm:cxn modelId="{E3931440-AC71-456B-B704-F98A5224C6E4}" type="presParOf" srcId="{1D84D8B6-AB32-4491-B5D2-EFE3D7668B88}" destId="{227983A4-7694-4DB2-8ADB-03C8834387D3}" srcOrd="3" destOrd="0" presId="urn:microsoft.com/office/officeart/2005/8/layout/vProcess5"/>
+    <dgm:cxn modelId="{E8F97CB4-8C61-46DF-83B3-3DFE79134D6D}" type="presParOf" srcId="{1D84D8B6-AB32-4491-B5D2-EFE3D7668B88}" destId="{5C4F53F3-3A5B-4BD7-AD9C-7F581284DC3C}" srcOrd="4" destOrd="0" presId="urn:microsoft.com/office/officeart/2005/8/layout/vProcess5"/>
+    <dgm:cxn modelId="{F7A63205-6C2E-4C6B-A7A8-14346039B235}" type="presParOf" srcId="{1D84D8B6-AB32-4491-B5D2-EFE3D7668B88}" destId="{4A26986F-8307-4281-968A-DF9182241FA5}" srcOrd="5" destOrd="0" presId="urn:microsoft.com/office/officeart/2005/8/layout/vProcess5"/>
+    <dgm:cxn modelId="{511E285D-BFC5-4BA7-B3AA-B78F5755DF48}" type="presParOf" srcId="{1D84D8B6-AB32-4491-B5D2-EFE3D7668B88}" destId="{DC1A69C5-ECD2-4EB2-90CA-135058ED9122}" srcOrd="6" destOrd="0" presId="urn:microsoft.com/office/officeart/2005/8/layout/vProcess5"/>
+    <dgm:cxn modelId="{36F13BE5-6BA2-43A7-B7A8-1D0322067F9D}" type="presParOf" srcId="{1D84D8B6-AB32-4491-B5D2-EFE3D7668B88}" destId="{4FDBBB16-884D-4BFE-98CF-122F318D9E61}" srcOrd="7" destOrd="0" presId="urn:microsoft.com/office/officeart/2005/8/layout/vProcess5"/>
+    <dgm:cxn modelId="{BF79AC5F-5483-4525-B070-0707B917E7FB}" type="presParOf" srcId="{1D84D8B6-AB32-4491-B5D2-EFE3D7668B88}" destId="{BE4C7D82-E3E5-4516-A397-8CFB32AE9BDF}" srcOrd="8" destOrd="0" presId="urn:microsoft.com/office/officeart/2005/8/layout/vProcess5"/>
   </dgm:cxnLst>
   <dgm:bg/>
   <dgm:whole/>
@@ -1384,7 +1384,7 @@
       <dsp:cNvGrpSpPr/>
     </dsp:nvGrpSpPr>
     <dsp:grpSpPr/>
-    <dsp:sp modelId="{124EF20B-D98C-45B2-BB13-7B93B5373CEB}">
+    <dsp:sp modelId="{220667EB-7A5C-4EA9-99D4-0E30A089AE46}">
       <dsp:nvSpPr>
         <dsp:cNvPr id="0" name=""/>
         <dsp:cNvSpPr/>
@@ -1442,12 +1442,12 @@
         </a:fontRef>
       </dsp:style>
       <dsp:txBody>
-        <a:bodyPr spcFirstLastPara="0" vert="horz" wrap="square" lIns="163830" tIns="163830" rIns="163830" bIns="163830" numCol="1" spcCol="1270" rtlCol="0" anchor="ctr" anchorCtr="0">
+        <a:bodyPr spcFirstLastPara="0" vert="horz" wrap="square" lIns="60960" tIns="60960" rIns="60960" bIns="60960" numCol="1" spcCol="1270" rtlCol="0" anchor="ctr" anchorCtr="0">
           <a:noAutofit/>
         </a:bodyPr>
         <a:lstStyle/>
         <a:p>
-          <a:pPr marL="0" lvl="0" indent="0" algn="l" defTabSz="1911350" rtl="0">
+          <a:pPr marL="0" lvl="0" indent="0" algn="l" defTabSz="711200" rtl="0">
             <a:lnSpc>
               <a:spcPct val="90000"/>
             </a:lnSpc>
@@ -1460,8 +1460,8 @@
             <a:buNone/>
           </a:pPr>
           <a:r>
-            <a:rPr lang="ro" sz="4300" kern="1200"/>
-            <a:t>Activitate 1</a:t>
+            <a:rPr lang="ro" sz="1600" kern="1200" dirty="0"/>
+            <a:t>Preluare țară nouă și introducere în listă.</a:t>
           </a:r>
         </a:p>
       </dsp:txBody>
@@ -1470,14 +1470,14 @@
         <a:ext cx="2871019" cy="1261215"/>
       </dsp:txXfrm>
     </dsp:sp>
-    <dsp:sp modelId="{CA544AF7-F7B2-4CA5-9251-B4CDB8D06634}">
+    <dsp:sp modelId="{CE8F4615-0112-44D3-A508-ED8F9011EB8A}">
       <dsp:nvSpPr>
         <dsp:cNvPr id="0" name=""/>
         <dsp:cNvSpPr/>
       </dsp:nvSpPr>
       <dsp:spPr>
         <a:xfrm>
-          <a:off x="380880" y="1562972"/>
+          <a:off x="380880" y="1578419"/>
           <a:ext cx="4316650" cy="1339691"/>
         </a:xfrm>
         <a:prstGeom prst="roundRect">
@@ -1558,12 +1558,12 @@
         </a:fontRef>
       </dsp:style>
       <dsp:txBody>
-        <a:bodyPr spcFirstLastPara="0" vert="horz" wrap="square" lIns="163830" tIns="163830" rIns="163830" bIns="163830" numCol="1" spcCol="1270" rtlCol="0" anchor="ctr" anchorCtr="0">
+        <a:bodyPr spcFirstLastPara="0" vert="horz" wrap="square" lIns="60960" tIns="60960" rIns="60960" bIns="60960" numCol="1" spcCol="1270" rtlCol="0" anchor="ctr" anchorCtr="0">
           <a:noAutofit/>
         </a:bodyPr>
         <a:lstStyle/>
         <a:p>
-          <a:pPr marL="0" lvl="0" indent="0" algn="l" defTabSz="1911350" rtl="0">
+          <a:pPr marL="0" lvl="0" indent="0" algn="l" defTabSz="711200" rtl="0">
             <a:lnSpc>
               <a:spcPct val="90000"/>
             </a:lnSpc>
@@ -1576,17 +1576,17 @@
             <a:buNone/>
           </a:pPr>
           <a:r>
-            <a:rPr lang="ro" sz="4300" kern="1200" dirty="0"/>
-            <a:t>Activitate 2</a:t>
+            <a:rPr lang="ro" sz="1600" kern="1200" dirty="0"/>
+            <a:t>Verificare prezență țară nouă în lista de vecini a țărilor deja existente/verificare prezenței țărilor existente deja în lista de vecini a noii țări.</a:t>
           </a:r>
         </a:p>
       </dsp:txBody>
       <dsp:txXfrm>
-        <a:off x="420118" y="1602210"/>
+        <a:off x="420118" y="1617657"/>
         <a:ext cx="2986494" cy="1261215"/>
       </dsp:txXfrm>
     </dsp:sp>
-    <dsp:sp modelId="{2AE92D3F-F0FA-45DD-BB60-4C6FBC6BC016}">
+    <dsp:sp modelId="{227983A4-7694-4DB2-8ADB-03C8834387D3}">
       <dsp:nvSpPr>
         <dsp:cNvPr id="0" name=""/>
         <dsp:cNvSpPr/>
@@ -1652,12 +1652,12 @@
         </a:fontRef>
       </dsp:style>
       <dsp:txBody>
-        <a:bodyPr spcFirstLastPara="0" vert="horz" wrap="square" lIns="163830" tIns="163830" rIns="163830" bIns="163830" numCol="1" spcCol="1270" rtlCol="0" anchor="ctr" anchorCtr="0">
+        <a:bodyPr spcFirstLastPara="0" vert="horz" wrap="square" lIns="60960" tIns="60960" rIns="60960" bIns="60960" numCol="1" spcCol="1270" rtlCol="0" anchor="ctr" anchorCtr="0">
           <a:noAutofit/>
         </a:bodyPr>
         <a:lstStyle/>
         <a:p>
-          <a:pPr marL="0" lvl="0" indent="0" algn="l" defTabSz="1911350" rtl="0">
+          <a:pPr marL="0" lvl="0" indent="0" algn="l" defTabSz="711200" rtl="0">
             <a:lnSpc>
               <a:spcPct val="90000"/>
             </a:lnSpc>
@@ -1670,8 +1670,8 @@
             <a:buNone/>
           </a:pPr>
           <a:r>
-            <a:rPr lang="ro" sz="4300" kern="1200"/>
-            <a:t>Activitate 3</a:t>
+            <a:rPr lang="ro" sz="1600" kern="1200" dirty="0"/>
+            <a:t>Salvare date într-o structură auxiliară pentru seliarizare.</a:t>
           </a:r>
         </a:p>
       </dsp:txBody>
@@ -1680,14 +1680,14 @@
         <a:ext cx="2986494" cy="1261215"/>
       </dsp:txXfrm>
     </dsp:sp>
-    <dsp:sp modelId="{9CA877D8-99F8-40A0-89E9-59A61C9A70F4}">
+    <dsp:sp modelId="{5C4F53F3-3A5B-4BD7-AD9C-7F581284DC3C}">
       <dsp:nvSpPr>
         <dsp:cNvPr id="0" name=""/>
         <dsp:cNvSpPr/>
       </dsp:nvSpPr>
       <dsp:spPr>
         <a:xfrm>
-          <a:off x="3445850" y="1015932"/>
+          <a:off x="3842073" y="1002356"/>
           <a:ext cx="870799" cy="870799"/>
         </a:xfrm>
         <a:prstGeom prst="downArrow">
@@ -1755,11 +1755,11 @@
         </a:p>
       </dsp:txBody>
       <dsp:txXfrm>
-        <a:off x="3641780" y="1015932"/>
+        <a:off x="4038003" y="1002356"/>
         <a:ext cx="478939" cy="655276"/>
       </dsp:txXfrm>
     </dsp:sp>
-    <dsp:sp modelId="{62643EF2-016C-41F1-8CBC-398422A85727}">
+    <dsp:sp modelId="{4A26986F-8307-4281-968A-DF9182241FA5}">
       <dsp:nvSpPr>
         <dsp:cNvPr id="0" name=""/>
         <dsp:cNvSpPr/>
@@ -14003,20 +14003,12 @@
               <a:t>. Funcțiile specifice se găsesc în clasa </a:t>
             </a:r>
             <a:r>
-              <a:rPr lang="ro-RO" i="1" dirty="0" err="1"/>
+              <a:rPr lang="ro-RO" i="1" dirty="0"/>
               <a:t>Utility</a:t>
             </a:r>
             <a:r>
               <a:rPr lang="ro-RO" dirty="0"/>
-              <a:t> și sunt apelate doar în anumite momente ale execuției (de ex.: după executarea </a:t>
-            </a:r>
-            <a:r>
-              <a:rPr lang="ro-RO" dirty="0" err="1"/>
-              <a:t>alforitmului</a:t>
-            </a:r>
-            <a:r>
-              <a:rPr lang="ro-RO" dirty="0"/>
-              <a:t>). Aceste procese și funcții au fost realizate de către IONESCU Alin Ioan Robert.</a:t>
+              <a:t> și sunt apelate doar în anumite momente ale execuției (de ex.: după executarea algoritmului). </a:t>
             </a:r>
           </a:p>
         </p:txBody>
@@ -14431,6 +14423,16 @@
               <a:t>. dr. inf. Chirilă Oana</a:t>
             </a:r>
           </a:p>
+          <a:p>
+            <a:pPr marL="342900" indent="-342900">
+              <a:buFont typeface="Wingdings" panose="05000000000000000000" pitchFamily="2" charset="2"/>
+              <a:buChar char="§"/>
+            </a:pPr>
+            <a:r>
+              <a:rPr lang="ro-RO" dirty="0"/>
+              <a:t>https://blog.udemy.com/csharp-serialize-to-xml/</a:t>
+            </a:r>
+          </a:p>
         </p:txBody>
       </p:sp>
     </p:spTree>
@@ -16071,13 +16073,39 @@
         </p:nvSpPr>
         <p:spPr/>
         <p:txBody>
-          <a:bodyPr rtlCol="0"/>
+          <a:bodyPr rtlCol="0">
+            <a:normAutofit fontScale="92500" lnSpcReduction="10000"/>
+          </a:bodyPr>
           <a:lstStyle/>
           <a:p>
-            <a:pPr marL="0" indent="0" rtl="0">
-              <a:buNone/>
+            <a:pPr marL="514350" indent="-514350" rtl="0">
+              <a:buFont typeface="+mj-lt"/>
+              <a:buAutoNum type="arabicPeriod"/>
             </a:pPr>
-            <a:endParaRPr lang="ro-RO" dirty="0"/>
+            <a:r>
+              <a:rPr lang="ro-RO" dirty="0"/>
+              <a:t>Preluare listă care conține țara și vecinii acesteia și o listă care conține culori.</a:t>
+            </a:r>
+          </a:p>
+          <a:p>
+            <a:pPr marL="514350" indent="-514350" rtl="0">
+              <a:buFont typeface="+mj-lt"/>
+              <a:buAutoNum type="arabicPeriod"/>
+            </a:pPr>
+            <a:r>
+              <a:rPr lang="ro-RO" dirty="0"/>
+              <a:t>Țările se introduc pe rând într-o listă, iar acestora li se atribuie o culoare în funcție de criteriul: dacă doua țări sunt vecine, acestea nu pot avea aceași culoare.</a:t>
+            </a:r>
+          </a:p>
+          <a:p>
+            <a:pPr marL="514350" indent="-514350" rtl="0">
+              <a:buFont typeface="+mj-lt"/>
+              <a:buAutoNum type="arabicPeriod"/>
+            </a:pPr>
+            <a:r>
+              <a:rPr lang="ro-RO" dirty="0"/>
+              <a:t>Salvare într-o structură auxiliară pentru a fi salvate într-un fișier XML.</a:t>
+            </a:r>
           </a:p>
         </p:txBody>
       </p:sp>
@@ -16091,7 +16119,7 @@
             <p:ph sz="half" idx="2"/>
             <p:extLst>
               <p:ext uri="{D42A27DB-BD31-4B8C-83A1-F6EECF244321}">
-                <p14:modId xmlns:p14="http://schemas.microsoft.com/office/powerpoint/2010/main" val="2561100622"/>
+                <p14:modId xmlns:p14="http://schemas.microsoft.com/office/powerpoint/2010/main" val="2371276898"/>
               </p:ext>
             </p:extLst>
           </p:nvPr>
@@ -16106,6 +16134,154 @@
           </a:graphicData>
         </a:graphic>
       </p:graphicFrame>
+      <p:grpSp>
+        <p:nvGrpSpPr>
+          <p:cNvPr id="6" name="Group 5">
+            <a:extLst>
+              <a:ext uri="{FF2B5EF4-FFF2-40B4-BE49-F238E27FC236}">
+                <a16:creationId xmlns:a16="http://schemas.microsoft.com/office/drawing/2014/main" id="{5ACDE22E-EAC7-AC45-3333-A498B21C04B9}"/>
+              </a:ext>
+            </a:extLst>
+          </p:cNvPr>
+          <p:cNvGrpSpPr/>
+          <p:nvPr/>
+        </p:nvGrpSpPr>
+        <p:grpSpPr>
+          <a:xfrm rot="10800000">
+            <a:off x="9478788" y="2708920"/>
+            <a:ext cx="870799" cy="864096"/>
+            <a:chOff x="3445850" y="1015932"/>
+            <a:chExt cx="870799" cy="870799"/>
+          </a:xfrm>
+        </p:grpSpPr>
+        <p:sp>
+          <p:nvSpPr>
+            <p:cNvPr id="7" name="Arrow: Down 6">
+              <a:extLst>
+                <a:ext uri="{FF2B5EF4-FFF2-40B4-BE49-F238E27FC236}">
+                  <a16:creationId xmlns:a16="http://schemas.microsoft.com/office/drawing/2014/main" id="{8EB82E90-5880-E7A0-8AD6-B829E893BB68}"/>
+                </a:ext>
+              </a:extLst>
+            </p:cNvPr>
+            <p:cNvSpPr/>
+            <p:nvPr/>
+          </p:nvSpPr>
+          <p:spPr>
+            <a:xfrm>
+              <a:off x="3445850" y="1015932"/>
+              <a:ext cx="870799" cy="870799"/>
+            </a:xfrm>
+            <a:prstGeom prst="downArrow">
+              <a:avLst>
+                <a:gd name="adj1" fmla="val 55000"/>
+                <a:gd name="adj2" fmla="val 45000"/>
+              </a:avLst>
+            </a:prstGeom>
+          </p:spPr>
+          <p:style>
+            <a:lnRef idx="1">
+              <a:schemeClr val="accent2">
+                <a:tint val="40000"/>
+                <a:alpha val="90000"/>
+                <a:hueOff val="0"/>
+                <a:satOff val="0"/>
+                <a:lumOff val="0"/>
+                <a:alphaOff val="0"/>
+              </a:schemeClr>
+            </a:lnRef>
+            <a:fillRef idx="1">
+              <a:schemeClr val="accent2">
+                <a:tint val="40000"/>
+                <a:alpha val="90000"/>
+                <a:hueOff val="0"/>
+                <a:satOff val="0"/>
+                <a:lumOff val="0"/>
+                <a:alphaOff val="0"/>
+              </a:schemeClr>
+            </a:fillRef>
+            <a:effectRef idx="0">
+              <a:schemeClr val="accent2">
+                <a:tint val="40000"/>
+                <a:alpha val="90000"/>
+                <a:hueOff val="0"/>
+                <a:satOff val="0"/>
+                <a:lumOff val="0"/>
+                <a:alphaOff val="0"/>
+              </a:schemeClr>
+            </a:effectRef>
+            <a:fontRef idx="minor">
+              <a:schemeClr val="dk1">
+                <a:hueOff val="0"/>
+                <a:satOff val="0"/>
+                <a:lumOff val="0"/>
+                <a:alphaOff val="0"/>
+              </a:schemeClr>
+            </a:fontRef>
+          </p:style>
+        </p:sp>
+        <p:sp>
+          <p:nvSpPr>
+            <p:cNvPr id="8" name="Arrow: Down 4">
+              <a:extLst>
+                <a:ext uri="{FF2B5EF4-FFF2-40B4-BE49-F238E27FC236}">
+                  <a16:creationId xmlns:a16="http://schemas.microsoft.com/office/drawing/2014/main" id="{CD43FA81-F62A-BF3E-460B-D7F3971FFA67}"/>
+                </a:ext>
+              </a:extLst>
+            </p:cNvPr>
+            <p:cNvSpPr txBox="1"/>
+            <p:nvPr/>
+          </p:nvSpPr>
+          <p:spPr>
+            <a:xfrm>
+              <a:off x="3641780" y="1015932"/>
+              <a:ext cx="478939" cy="655276"/>
+            </a:xfrm>
+            <a:prstGeom prst="rect">
+              <a:avLst/>
+            </a:prstGeom>
+          </p:spPr>
+          <p:style>
+            <a:lnRef idx="0">
+              <a:scrgbClr r="0" g="0" b="0"/>
+            </a:lnRef>
+            <a:fillRef idx="0">
+              <a:scrgbClr r="0" g="0" b="0"/>
+            </a:fillRef>
+            <a:effectRef idx="0">
+              <a:scrgbClr r="0" g="0" b="0"/>
+            </a:effectRef>
+            <a:fontRef idx="minor">
+              <a:schemeClr val="dk1">
+                <a:hueOff val="0"/>
+                <a:satOff val="0"/>
+                <a:lumOff val="0"/>
+                <a:alphaOff val="0"/>
+              </a:schemeClr>
+            </a:fontRef>
+          </p:style>
+          <p:txBody>
+            <a:bodyPr spcFirstLastPara="0" vert="horz" wrap="square" lIns="45720" tIns="45720" rIns="45720" bIns="45720" numCol="1" spcCol="1270" rtlCol="0" anchor="ctr" anchorCtr="0">
+              <a:noAutofit/>
+            </a:bodyPr>
+            <a:lstStyle/>
+            <a:p>
+              <a:pPr marL="0" lvl="0" indent="0" algn="ctr" defTabSz="1600200" rtl="0">
+                <a:lnSpc>
+                  <a:spcPct val="90000"/>
+                </a:lnSpc>
+                <a:spcBef>
+                  <a:spcPct val="0"/>
+                </a:spcBef>
+                <a:spcAft>
+                  <a:spcPct val="35000"/>
+                </a:spcAft>
+                <a:buNone/>
+              </a:pPr>
+              <a:endParaRPr lang="en-US" sz="3600" kern="1200"/>
+            </a:p>
+          </p:txBody>
+        </p:sp>
+      </p:grpSp>
     </p:spTree>
     <p:extLst>
       <p:ext uri="{BB962C8B-B14F-4D97-AF65-F5344CB8AC3E}">
@@ -17565,151 +17741,6 @@
 </file>
 
 <file path=customXml/item1.xml><?xml version="1.0" encoding="utf-8"?>
-<?mso-contentType ?>
-<FormTemplates xmlns="http://schemas.microsoft.com/sharepoint/v3/contenttype/forms">
-  <Display>DocumentLibraryForm</Display>
-  <Edit>AssetEditForm</Edit>
-  <New>DocumentLibraryForm</New>
-</FormTemplates>
-</file>
-
-<file path=customXml/item2.xml><?xml version="1.0" encoding="utf-8"?>
-<p:properties xmlns:p="http://schemas.microsoft.com/office/2006/metadata/properties" xmlns:xsi="http://www.w3.org/2001/XMLSchema-instance" xmlns:pc="http://schemas.microsoft.com/office/infopath/2007/PartnerControls">
-  <documentManagement>
-    <LocPublishedLinkedAssetsLookup xmlns="4873beb7-5857-4685-be1f-d57550cc96cc" xsi:nil="true"/>
-    <ApprovalStatus xmlns="4873beb7-5857-4685-be1f-d57550cc96cc">InProgress</ApprovalStatus>
-    <MarketSpecific xmlns="4873beb7-5857-4685-be1f-d57550cc96cc">false</MarketSpecific>
-    <LocComments xmlns="4873beb7-5857-4685-be1f-d57550cc96cc" xsi:nil="true"/>
-    <LocLastLocAttemptVersionTypeLookup xmlns="4873beb7-5857-4685-be1f-d57550cc96cc" xsi:nil="true"/>
-    <DirectSourceMarket xmlns="4873beb7-5857-4685-be1f-d57550cc96cc" xsi:nil="true"/>
-    <ThumbnailAssetId xmlns="4873beb7-5857-4685-be1f-d57550cc96cc" xsi:nil="true"/>
-    <PrimaryImageGen xmlns="4873beb7-5857-4685-be1f-d57550cc96cc">false</PrimaryImageGen>
-    <LocNewPublishedVersionLookup xmlns="4873beb7-5857-4685-be1f-d57550cc96cc" xsi:nil="true"/>
-    <LegacyData xmlns="4873beb7-5857-4685-be1f-d57550cc96cc" xsi:nil="true"/>
-    <LocRecommendedHandoff xmlns="4873beb7-5857-4685-be1f-d57550cc96cc" xsi:nil="true"/>
-    <BusinessGroup xmlns="4873beb7-5857-4685-be1f-d57550cc96cc" xsi:nil="true"/>
-    <BlockPublish xmlns="4873beb7-5857-4685-be1f-d57550cc96cc">false</BlockPublish>
-    <TPFriendlyName xmlns="4873beb7-5857-4685-be1f-d57550cc96cc" xsi:nil="true"/>
-    <LocOverallPublishStatusLookup xmlns="4873beb7-5857-4685-be1f-d57550cc96cc" xsi:nil="true"/>
-    <NumericId xmlns="4873beb7-5857-4685-be1f-d57550cc96cc" xsi:nil="true"/>
-    <APEditor xmlns="4873beb7-5857-4685-be1f-d57550cc96cc">
-      <UserInfo>
-        <DisplayName/>
-        <AccountId xsi:nil="true"/>
-        <AccountType/>
-      </UserInfo>
-    </APEditor>
-    <SourceTitle xmlns="4873beb7-5857-4685-be1f-d57550cc96cc" xsi:nil="true"/>
-    <OpenTemplate xmlns="4873beb7-5857-4685-be1f-d57550cc96cc">true</OpenTemplate>
-    <LocOverallLocStatusLookup xmlns="4873beb7-5857-4685-be1f-d57550cc96cc" xsi:nil="true"/>
-    <UALocComments xmlns="4873beb7-5857-4685-be1f-d57550cc96cc" xsi:nil="true"/>
-    <ParentAssetId xmlns="4873beb7-5857-4685-be1f-d57550cc96cc" xsi:nil="true"/>
-    <IntlLangReviewDate xmlns="4873beb7-5857-4685-be1f-d57550cc96cc" xsi:nil="true"/>
-    <FeatureTagsTaxHTField0 xmlns="4873beb7-5857-4685-be1f-d57550cc96cc">
-      <Terms xmlns="http://schemas.microsoft.com/office/infopath/2007/PartnerControls"/>
-    </FeatureTagsTaxHTField0>
-    <PublishStatusLookup xmlns="4873beb7-5857-4685-be1f-d57550cc96cc">
-      <Value>1345093</Value>
-    </PublishStatusLookup>
-    <Providers xmlns="4873beb7-5857-4685-be1f-d57550cc96cc" xsi:nil="true"/>
-    <MachineTranslated xmlns="4873beb7-5857-4685-be1f-d57550cc96cc">false</MachineTranslated>
-    <OriginalSourceMarket xmlns="4873beb7-5857-4685-be1f-d57550cc96cc" xsi:nil="true"/>
-    <APDescription xmlns="4873beb7-5857-4685-be1f-d57550cc96cc">This simple template design works for technology and  businesses, but it's versatile enough to use in other contexts.  It features multiple slide layouts designed for widescreen (16x9 resolution) and includes a sample SmartArt list and chart that are easily editable.</APDescription>
-    <ClipArtFilename xmlns="4873beb7-5857-4685-be1f-d57550cc96cc" xsi:nil="true"/>
-    <ContentItem xmlns="4873beb7-5857-4685-be1f-d57550cc96cc" xsi:nil="true"/>
-    <TPInstallLocation xmlns="4873beb7-5857-4685-be1f-d57550cc96cc" xsi:nil="true"/>
-    <PublishTargets xmlns="4873beb7-5857-4685-be1f-d57550cc96cc">OfficeOnlineVNext</PublishTargets>
-    <TimesCloned xmlns="4873beb7-5857-4685-be1f-d57550cc96cc" xsi:nil="true"/>
-    <AssetStart xmlns="4873beb7-5857-4685-be1f-d57550cc96cc">2011-11-26T00:30:00+00:00</AssetStart>
-    <Provider xmlns="4873beb7-5857-4685-be1f-d57550cc96cc" xsi:nil="true"/>
-    <AcquiredFrom xmlns="4873beb7-5857-4685-be1f-d57550cc96cc">Internal MS</AcquiredFrom>
-    <FriendlyTitle xmlns="4873beb7-5857-4685-be1f-d57550cc96cc" xsi:nil="true"/>
-    <LastHandOff xmlns="4873beb7-5857-4685-be1f-d57550cc96cc" xsi:nil="true"/>
-    <TPClientViewer xmlns="4873beb7-5857-4685-be1f-d57550cc96cc" xsi:nil="true"/>
-    <TemplateStatus xmlns="4873beb7-5857-4685-be1f-d57550cc96cc">Complete</TemplateStatus>
-    <Downloads xmlns="4873beb7-5857-4685-be1f-d57550cc96cc">0</Downloads>
-    <OOCacheId xmlns="4873beb7-5857-4685-be1f-d57550cc96cc" xsi:nil="true"/>
-    <IsDeleted xmlns="4873beb7-5857-4685-be1f-d57550cc96cc">false</IsDeleted>
-    <LocPublishedDependentAssetsLookup xmlns="4873beb7-5857-4685-be1f-d57550cc96cc" xsi:nil="true"/>
-    <TPExecutable xmlns="4873beb7-5857-4685-be1f-d57550cc96cc" xsi:nil="true"/>
-    <EditorialTags xmlns="4873beb7-5857-4685-be1f-d57550cc96cc" xsi:nil="true"/>
-    <SubmitterId xmlns="4873beb7-5857-4685-be1f-d57550cc96cc" xsi:nil="true"/>
-    <ApprovalLog xmlns="4873beb7-5857-4685-be1f-d57550cc96cc" xsi:nil="true"/>
-    <AssetType xmlns="4873beb7-5857-4685-be1f-d57550cc96cc">TP</AssetType>
-    <BugNumber xmlns="4873beb7-5857-4685-be1f-d57550cc96cc" xsi:nil="true"/>
-    <CSXSubmissionDate xmlns="4873beb7-5857-4685-be1f-d57550cc96cc" xsi:nil="true"/>
-    <CSXUpdate xmlns="4873beb7-5857-4685-be1f-d57550cc96cc">false</CSXUpdate>
-    <Milestone xmlns="4873beb7-5857-4685-be1f-d57550cc96cc" xsi:nil="true"/>
-    <RecommendationsModifier xmlns="4873beb7-5857-4685-be1f-d57550cc96cc" xsi:nil="true"/>
-    <OriginAsset xmlns="4873beb7-5857-4685-be1f-d57550cc96cc" xsi:nil="true"/>
-    <TPComponent xmlns="4873beb7-5857-4685-be1f-d57550cc96cc" xsi:nil="true"/>
-    <AssetId xmlns="4873beb7-5857-4685-be1f-d57550cc96cc">TP102787989</AssetId>
-    <IntlLocPriority xmlns="4873beb7-5857-4685-be1f-d57550cc96cc" xsi:nil="true"/>
-    <PolicheckWords xmlns="4873beb7-5857-4685-be1f-d57550cc96cc" xsi:nil="true"/>
-    <TPLaunchHelpLink xmlns="4873beb7-5857-4685-be1f-d57550cc96cc" xsi:nil="true"/>
-    <TPApplication xmlns="4873beb7-5857-4685-be1f-d57550cc96cc" xsi:nil="true"/>
-    <CrawlForDependencies xmlns="4873beb7-5857-4685-be1f-d57550cc96cc">false</CrawlForDependencies>
-    <HandoffToMSDN xmlns="4873beb7-5857-4685-be1f-d57550cc96cc" xsi:nil="true"/>
-    <PlannedPubDate xmlns="4873beb7-5857-4685-be1f-d57550cc96cc" xsi:nil="true"/>
-    <IntlLangReviewer xmlns="4873beb7-5857-4685-be1f-d57550cc96cc" xsi:nil="true"/>
-    <TrustLevel xmlns="4873beb7-5857-4685-be1f-d57550cc96cc">1 Microsoft Managed Content</TrustLevel>
-    <LocLastLocAttemptVersionLookup xmlns="4873beb7-5857-4685-be1f-d57550cc96cc">694266</LocLastLocAttemptVersionLookup>
-    <LocProcessedForHandoffsLookup xmlns="4873beb7-5857-4685-be1f-d57550cc96cc" xsi:nil="true"/>
-    <IsSearchable xmlns="4873beb7-5857-4685-be1f-d57550cc96cc">true</IsSearchable>
-    <TemplateTemplateType xmlns="4873beb7-5857-4685-be1f-d57550cc96cc">PowerPoint Presentation Template</TemplateTemplateType>
-    <CampaignTagsTaxHTField0 xmlns="4873beb7-5857-4685-be1f-d57550cc96cc">
-      <Terms xmlns="http://schemas.microsoft.com/office/infopath/2007/PartnerControls"/>
-    </CampaignTagsTaxHTField0>
-    <TPNamespace xmlns="4873beb7-5857-4685-be1f-d57550cc96cc" xsi:nil="true"/>
-    <LocOverallPreviewStatusLookup xmlns="4873beb7-5857-4685-be1f-d57550cc96cc" xsi:nil="true"/>
-    <TaxCatchAll xmlns="4873beb7-5857-4685-be1f-d57550cc96cc"/>
-    <Markets xmlns="4873beb7-5857-4685-be1f-d57550cc96cc"/>
-    <UAProjectedTotalWords xmlns="4873beb7-5857-4685-be1f-d57550cc96cc" xsi:nil="true"/>
-    <IntlLangReview xmlns="4873beb7-5857-4685-be1f-d57550cc96cc" xsi:nil="true"/>
-    <OutputCachingOn xmlns="4873beb7-5857-4685-be1f-d57550cc96cc">false</OutputCachingOn>
-    <AverageRating xmlns="4873beb7-5857-4685-be1f-d57550cc96cc" xsi:nil="true"/>
-    <APAuthor xmlns="4873beb7-5857-4685-be1f-d57550cc96cc">
-      <UserInfo>
-        <DisplayName>REDMOND\kristaa</DisplayName>
-        <AccountId>136</AccountId>
-        <AccountType/>
-      </UserInfo>
-    </APAuthor>
-    <LocManualTestRequired xmlns="4873beb7-5857-4685-be1f-d57550cc96cc">false</LocManualTestRequired>
-    <TPCommandLine xmlns="4873beb7-5857-4685-be1f-d57550cc96cc" xsi:nil="true"/>
-    <TPAppVersion xmlns="4873beb7-5857-4685-be1f-d57550cc96cc" xsi:nil="true"/>
-    <EditorialStatus xmlns="4873beb7-5857-4685-be1f-d57550cc96cc">Complete</EditorialStatus>
-    <LastModifiedDateTime xmlns="4873beb7-5857-4685-be1f-d57550cc96cc" xsi:nil="true"/>
-    <ScenarioTagsTaxHTField0 xmlns="4873beb7-5857-4685-be1f-d57550cc96cc">
-      <Terms xmlns="http://schemas.microsoft.com/office/infopath/2007/PartnerControls"/>
-    </ScenarioTagsTaxHTField0>
-    <LocProcessedForMarketsLookup xmlns="4873beb7-5857-4685-be1f-d57550cc96cc" xsi:nil="true"/>
-    <TPLaunchHelpLinkType xmlns="4873beb7-5857-4685-be1f-d57550cc96cc">Template</TPLaunchHelpLinkType>
-    <OriginalRelease xmlns="4873beb7-5857-4685-be1f-d57550cc96cc">15</OriginalRelease>
-    <LocalizationTagsTaxHTField0 xmlns="4873beb7-5857-4685-be1f-d57550cc96cc">
-      <Terms xmlns="http://schemas.microsoft.com/office/infopath/2007/PartnerControls"/>
-    </LocalizationTagsTaxHTField0>
-    <UACurrentWords xmlns="4873beb7-5857-4685-be1f-d57550cc96cc" xsi:nil="true"/>
-    <ArtSampleDocs xmlns="4873beb7-5857-4685-be1f-d57550cc96cc" xsi:nil="true"/>
-    <UALocRecommendation xmlns="4873beb7-5857-4685-be1f-d57550cc96cc">Localize</UALocRecommendation>
-    <Manager xmlns="4873beb7-5857-4685-be1f-d57550cc96cc" xsi:nil="true"/>
-    <LocOverallHandbackStatusLookup xmlns="4873beb7-5857-4685-be1f-d57550cc96cc" xsi:nil="true"/>
-    <ShowIn xmlns="4873beb7-5857-4685-be1f-d57550cc96cc">Show everywhere</ShowIn>
-    <UANotes xmlns="4873beb7-5857-4685-be1f-d57550cc96cc" xsi:nil="true"/>
-    <InternalTagsTaxHTField0 xmlns="4873beb7-5857-4685-be1f-d57550cc96cc">
-      <Terms xmlns="http://schemas.microsoft.com/office/infopath/2007/PartnerControls"/>
-    </InternalTagsTaxHTField0>
-    <CSXHash xmlns="4873beb7-5857-4685-be1f-d57550cc96cc" xsi:nil="true"/>
-    <VoteCount xmlns="4873beb7-5857-4685-be1f-d57550cc96cc" xsi:nil="true"/>
-    <AssetExpire xmlns="4873beb7-5857-4685-be1f-d57550cc96cc">2029-05-12T07:00:00+00:00</AssetExpire>
-    <DSATActionTaken xmlns="4873beb7-5857-4685-be1f-d57550cc96cc" xsi:nil="true"/>
-    <CSXSubmissionMarket xmlns="4873beb7-5857-4685-be1f-d57550cc96cc" xsi:nil="true"/>
-    <LocMarketGroupTiers2 xmlns="4873beb7-5857-4685-be1f-d57550cc96cc" xsi:nil="true"/>
-  </documentManagement>
-</p:properties>
-</file>
-
-<file path=customXml/item3.xml><?xml version="1.0" encoding="utf-8"?>
 <ct:contentTypeSchema xmlns:ct="http://schemas.microsoft.com/office/2006/metadata/contentType" xmlns:ma="http://schemas.microsoft.com/office/2006/metadata/properties/metaAttributes" ct:_="" ma:_="" ma:contentTypeName="TemplateFile" ma:contentTypeID="0x0101006EDDDB5EE6D98C44930B742096920B300400F5B6D36B3EF94B4E9A635CDF2A18F5B8" ma:contentTypeVersion="72" ma:contentTypeDescription="Create a new document." ma:contentTypeScope="" ma:versionID="a23e56308344d904b51738559c3d67c9">
   <xsd:schema xmlns:xsd="http://www.w3.org/2001/XMLSchema" xmlns:xs="http://www.w3.org/2001/XMLSchema" xmlns:p="http://schemas.microsoft.com/office/2006/metadata/properties" xmlns:ns2="4873beb7-5857-4685-be1f-d57550cc96cc" targetNamespace="http://schemas.microsoft.com/office/2006/metadata/properties" ma:root="true" ma:fieldsID="cd0908cc4600e77bf5da051303e00c8d" ns2:_="">
     <xsd:import namespace="4873beb7-5857-4685-be1f-d57550cc96cc"/>
@@ -18749,10 +18780,165 @@
 </ct:contentTypeSchema>
 </file>
 
+<file path=customXml/item2.xml><?xml version="1.0" encoding="utf-8"?>
+<p:properties xmlns:p="http://schemas.microsoft.com/office/2006/metadata/properties" xmlns:xsi="http://www.w3.org/2001/XMLSchema-instance" xmlns:pc="http://schemas.microsoft.com/office/infopath/2007/PartnerControls">
+  <documentManagement>
+    <LocPublishedLinkedAssetsLookup xmlns="4873beb7-5857-4685-be1f-d57550cc96cc" xsi:nil="true"/>
+    <ApprovalStatus xmlns="4873beb7-5857-4685-be1f-d57550cc96cc">InProgress</ApprovalStatus>
+    <MarketSpecific xmlns="4873beb7-5857-4685-be1f-d57550cc96cc">false</MarketSpecific>
+    <LocComments xmlns="4873beb7-5857-4685-be1f-d57550cc96cc" xsi:nil="true"/>
+    <LocLastLocAttemptVersionTypeLookup xmlns="4873beb7-5857-4685-be1f-d57550cc96cc" xsi:nil="true"/>
+    <DirectSourceMarket xmlns="4873beb7-5857-4685-be1f-d57550cc96cc" xsi:nil="true"/>
+    <ThumbnailAssetId xmlns="4873beb7-5857-4685-be1f-d57550cc96cc" xsi:nil="true"/>
+    <PrimaryImageGen xmlns="4873beb7-5857-4685-be1f-d57550cc96cc">false</PrimaryImageGen>
+    <LocNewPublishedVersionLookup xmlns="4873beb7-5857-4685-be1f-d57550cc96cc" xsi:nil="true"/>
+    <LegacyData xmlns="4873beb7-5857-4685-be1f-d57550cc96cc" xsi:nil="true"/>
+    <LocRecommendedHandoff xmlns="4873beb7-5857-4685-be1f-d57550cc96cc" xsi:nil="true"/>
+    <BusinessGroup xmlns="4873beb7-5857-4685-be1f-d57550cc96cc" xsi:nil="true"/>
+    <BlockPublish xmlns="4873beb7-5857-4685-be1f-d57550cc96cc">false</BlockPublish>
+    <TPFriendlyName xmlns="4873beb7-5857-4685-be1f-d57550cc96cc" xsi:nil="true"/>
+    <LocOverallPublishStatusLookup xmlns="4873beb7-5857-4685-be1f-d57550cc96cc" xsi:nil="true"/>
+    <NumericId xmlns="4873beb7-5857-4685-be1f-d57550cc96cc" xsi:nil="true"/>
+    <APEditor xmlns="4873beb7-5857-4685-be1f-d57550cc96cc">
+      <UserInfo>
+        <DisplayName/>
+        <AccountId xsi:nil="true"/>
+        <AccountType/>
+      </UserInfo>
+    </APEditor>
+    <SourceTitle xmlns="4873beb7-5857-4685-be1f-d57550cc96cc" xsi:nil="true"/>
+    <OpenTemplate xmlns="4873beb7-5857-4685-be1f-d57550cc96cc">true</OpenTemplate>
+    <LocOverallLocStatusLookup xmlns="4873beb7-5857-4685-be1f-d57550cc96cc" xsi:nil="true"/>
+    <UALocComments xmlns="4873beb7-5857-4685-be1f-d57550cc96cc" xsi:nil="true"/>
+    <ParentAssetId xmlns="4873beb7-5857-4685-be1f-d57550cc96cc" xsi:nil="true"/>
+    <IntlLangReviewDate xmlns="4873beb7-5857-4685-be1f-d57550cc96cc" xsi:nil="true"/>
+    <FeatureTagsTaxHTField0 xmlns="4873beb7-5857-4685-be1f-d57550cc96cc">
+      <Terms xmlns="http://schemas.microsoft.com/office/infopath/2007/PartnerControls"/>
+    </FeatureTagsTaxHTField0>
+    <PublishStatusLookup xmlns="4873beb7-5857-4685-be1f-d57550cc96cc">
+      <Value>1345093</Value>
+    </PublishStatusLookup>
+    <Providers xmlns="4873beb7-5857-4685-be1f-d57550cc96cc" xsi:nil="true"/>
+    <MachineTranslated xmlns="4873beb7-5857-4685-be1f-d57550cc96cc">false</MachineTranslated>
+    <OriginalSourceMarket xmlns="4873beb7-5857-4685-be1f-d57550cc96cc" xsi:nil="true"/>
+    <APDescription xmlns="4873beb7-5857-4685-be1f-d57550cc96cc">This simple template design works for technology and  businesses, but it's versatile enough to use in other contexts.  It features multiple slide layouts designed for widescreen (16x9 resolution) and includes a sample SmartArt list and chart that are easily editable.</APDescription>
+    <ClipArtFilename xmlns="4873beb7-5857-4685-be1f-d57550cc96cc" xsi:nil="true"/>
+    <ContentItem xmlns="4873beb7-5857-4685-be1f-d57550cc96cc" xsi:nil="true"/>
+    <TPInstallLocation xmlns="4873beb7-5857-4685-be1f-d57550cc96cc" xsi:nil="true"/>
+    <PublishTargets xmlns="4873beb7-5857-4685-be1f-d57550cc96cc">OfficeOnlineVNext</PublishTargets>
+    <TimesCloned xmlns="4873beb7-5857-4685-be1f-d57550cc96cc" xsi:nil="true"/>
+    <AssetStart xmlns="4873beb7-5857-4685-be1f-d57550cc96cc">2011-11-26T00:30:00+00:00</AssetStart>
+    <Provider xmlns="4873beb7-5857-4685-be1f-d57550cc96cc" xsi:nil="true"/>
+    <AcquiredFrom xmlns="4873beb7-5857-4685-be1f-d57550cc96cc">Internal MS</AcquiredFrom>
+    <FriendlyTitle xmlns="4873beb7-5857-4685-be1f-d57550cc96cc" xsi:nil="true"/>
+    <LastHandOff xmlns="4873beb7-5857-4685-be1f-d57550cc96cc" xsi:nil="true"/>
+    <TPClientViewer xmlns="4873beb7-5857-4685-be1f-d57550cc96cc" xsi:nil="true"/>
+    <TemplateStatus xmlns="4873beb7-5857-4685-be1f-d57550cc96cc">Complete</TemplateStatus>
+    <Downloads xmlns="4873beb7-5857-4685-be1f-d57550cc96cc">0</Downloads>
+    <OOCacheId xmlns="4873beb7-5857-4685-be1f-d57550cc96cc" xsi:nil="true"/>
+    <IsDeleted xmlns="4873beb7-5857-4685-be1f-d57550cc96cc">false</IsDeleted>
+    <LocPublishedDependentAssetsLookup xmlns="4873beb7-5857-4685-be1f-d57550cc96cc" xsi:nil="true"/>
+    <TPExecutable xmlns="4873beb7-5857-4685-be1f-d57550cc96cc" xsi:nil="true"/>
+    <EditorialTags xmlns="4873beb7-5857-4685-be1f-d57550cc96cc" xsi:nil="true"/>
+    <SubmitterId xmlns="4873beb7-5857-4685-be1f-d57550cc96cc" xsi:nil="true"/>
+    <ApprovalLog xmlns="4873beb7-5857-4685-be1f-d57550cc96cc" xsi:nil="true"/>
+    <AssetType xmlns="4873beb7-5857-4685-be1f-d57550cc96cc">TP</AssetType>
+    <BugNumber xmlns="4873beb7-5857-4685-be1f-d57550cc96cc" xsi:nil="true"/>
+    <CSXSubmissionDate xmlns="4873beb7-5857-4685-be1f-d57550cc96cc" xsi:nil="true"/>
+    <CSXUpdate xmlns="4873beb7-5857-4685-be1f-d57550cc96cc">false</CSXUpdate>
+    <Milestone xmlns="4873beb7-5857-4685-be1f-d57550cc96cc" xsi:nil="true"/>
+    <RecommendationsModifier xmlns="4873beb7-5857-4685-be1f-d57550cc96cc" xsi:nil="true"/>
+    <OriginAsset xmlns="4873beb7-5857-4685-be1f-d57550cc96cc" xsi:nil="true"/>
+    <TPComponent xmlns="4873beb7-5857-4685-be1f-d57550cc96cc" xsi:nil="true"/>
+    <AssetId xmlns="4873beb7-5857-4685-be1f-d57550cc96cc">TP102787989</AssetId>
+    <IntlLocPriority xmlns="4873beb7-5857-4685-be1f-d57550cc96cc" xsi:nil="true"/>
+    <PolicheckWords xmlns="4873beb7-5857-4685-be1f-d57550cc96cc" xsi:nil="true"/>
+    <TPLaunchHelpLink xmlns="4873beb7-5857-4685-be1f-d57550cc96cc" xsi:nil="true"/>
+    <TPApplication xmlns="4873beb7-5857-4685-be1f-d57550cc96cc" xsi:nil="true"/>
+    <CrawlForDependencies xmlns="4873beb7-5857-4685-be1f-d57550cc96cc">false</CrawlForDependencies>
+    <HandoffToMSDN xmlns="4873beb7-5857-4685-be1f-d57550cc96cc" xsi:nil="true"/>
+    <PlannedPubDate xmlns="4873beb7-5857-4685-be1f-d57550cc96cc" xsi:nil="true"/>
+    <IntlLangReviewer xmlns="4873beb7-5857-4685-be1f-d57550cc96cc" xsi:nil="true"/>
+    <TrustLevel xmlns="4873beb7-5857-4685-be1f-d57550cc96cc">1 Microsoft Managed Content</TrustLevel>
+    <LocLastLocAttemptVersionLookup xmlns="4873beb7-5857-4685-be1f-d57550cc96cc">694266</LocLastLocAttemptVersionLookup>
+    <LocProcessedForHandoffsLookup xmlns="4873beb7-5857-4685-be1f-d57550cc96cc" xsi:nil="true"/>
+    <IsSearchable xmlns="4873beb7-5857-4685-be1f-d57550cc96cc">true</IsSearchable>
+    <TemplateTemplateType xmlns="4873beb7-5857-4685-be1f-d57550cc96cc">PowerPoint Presentation Template</TemplateTemplateType>
+    <CampaignTagsTaxHTField0 xmlns="4873beb7-5857-4685-be1f-d57550cc96cc">
+      <Terms xmlns="http://schemas.microsoft.com/office/infopath/2007/PartnerControls"/>
+    </CampaignTagsTaxHTField0>
+    <TPNamespace xmlns="4873beb7-5857-4685-be1f-d57550cc96cc" xsi:nil="true"/>
+    <LocOverallPreviewStatusLookup xmlns="4873beb7-5857-4685-be1f-d57550cc96cc" xsi:nil="true"/>
+    <TaxCatchAll xmlns="4873beb7-5857-4685-be1f-d57550cc96cc"/>
+    <Markets xmlns="4873beb7-5857-4685-be1f-d57550cc96cc"/>
+    <UAProjectedTotalWords xmlns="4873beb7-5857-4685-be1f-d57550cc96cc" xsi:nil="true"/>
+    <IntlLangReview xmlns="4873beb7-5857-4685-be1f-d57550cc96cc" xsi:nil="true"/>
+    <OutputCachingOn xmlns="4873beb7-5857-4685-be1f-d57550cc96cc">false</OutputCachingOn>
+    <AverageRating xmlns="4873beb7-5857-4685-be1f-d57550cc96cc" xsi:nil="true"/>
+    <APAuthor xmlns="4873beb7-5857-4685-be1f-d57550cc96cc">
+      <UserInfo>
+        <DisplayName>REDMOND\kristaa</DisplayName>
+        <AccountId>136</AccountId>
+        <AccountType/>
+      </UserInfo>
+    </APAuthor>
+    <LocManualTestRequired xmlns="4873beb7-5857-4685-be1f-d57550cc96cc">false</LocManualTestRequired>
+    <TPCommandLine xmlns="4873beb7-5857-4685-be1f-d57550cc96cc" xsi:nil="true"/>
+    <TPAppVersion xmlns="4873beb7-5857-4685-be1f-d57550cc96cc" xsi:nil="true"/>
+    <EditorialStatus xmlns="4873beb7-5857-4685-be1f-d57550cc96cc">Complete</EditorialStatus>
+    <LastModifiedDateTime xmlns="4873beb7-5857-4685-be1f-d57550cc96cc" xsi:nil="true"/>
+    <ScenarioTagsTaxHTField0 xmlns="4873beb7-5857-4685-be1f-d57550cc96cc">
+      <Terms xmlns="http://schemas.microsoft.com/office/infopath/2007/PartnerControls"/>
+    </ScenarioTagsTaxHTField0>
+    <LocProcessedForMarketsLookup xmlns="4873beb7-5857-4685-be1f-d57550cc96cc" xsi:nil="true"/>
+    <TPLaunchHelpLinkType xmlns="4873beb7-5857-4685-be1f-d57550cc96cc">Template</TPLaunchHelpLinkType>
+    <OriginalRelease xmlns="4873beb7-5857-4685-be1f-d57550cc96cc">15</OriginalRelease>
+    <LocalizationTagsTaxHTField0 xmlns="4873beb7-5857-4685-be1f-d57550cc96cc">
+      <Terms xmlns="http://schemas.microsoft.com/office/infopath/2007/PartnerControls"/>
+    </LocalizationTagsTaxHTField0>
+    <UACurrentWords xmlns="4873beb7-5857-4685-be1f-d57550cc96cc" xsi:nil="true"/>
+    <ArtSampleDocs xmlns="4873beb7-5857-4685-be1f-d57550cc96cc" xsi:nil="true"/>
+    <UALocRecommendation xmlns="4873beb7-5857-4685-be1f-d57550cc96cc">Localize</UALocRecommendation>
+    <Manager xmlns="4873beb7-5857-4685-be1f-d57550cc96cc" xsi:nil="true"/>
+    <LocOverallHandbackStatusLookup xmlns="4873beb7-5857-4685-be1f-d57550cc96cc" xsi:nil="true"/>
+    <ShowIn xmlns="4873beb7-5857-4685-be1f-d57550cc96cc">Show everywhere</ShowIn>
+    <UANotes xmlns="4873beb7-5857-4685-be1f-d57550cc96cc" xsi:nil="true"/>
+    <InternalTagsTaxHTField0 xmlns="4873beb7-5857-4685-be1f-d57550cc96cc">
+      <Terms xmlns="http://schemas.microsoft.com/office/infopath/2007/PartnerControls"/>
+    </InternalTagsTaxHTField0>
+    <CSXHash xmlns="4873beb7-5857-4685-be1f-d57550cc96cc" xsi:nil="true"/>
+    <VoteCount xmlns="4873beb7-5857-4685-be1f-d57550cc96cc" xsi:nil="true"/>
+    <AssetExpire xmlns="4873beb7-5857-4685-be1f-d57550cc96cc">2029-05-12T07:00:00+00:00</AssetExpire>
+    <DSATActionTaken xmlns="4873beb7-5857-4685-be1f-d57550cc96cc" xsi:nil="true"/>
+    <CSXSubmissionMarket xmlns="4873beb7-5857-4685-be1f-d57550cc96cc" xsi:nil="true"/>
+    <LocMarketGroupTiers2 xmlns="4873beb7-5857-4685-be1f-d57550cc96cc" xsi:nil="true"/>
+  </documentManagement>
+</p:properties>
+</file>
+
+<file path=customXml/item3.xml><?xml version="1.0" encoding="utf-8"?>
+<?mso-contentType ?>
+<FormTemplates xmlns="http://schemas.microsoft.com/sharepoint/v3/contenttype/forms">
+  <Display>DocumentLibraryForm</Display>
+  <Edit>AssetEditForm</Edit>
+  <New>DocumentLibraryForm</New>
+</FormTemplates>
+</file>
+
 <file path=customXml/itemProps1.xml><?xml version="1.0" encoding="utf-8"?>
-<ds:datastoreItem xmlns:ds="http://schemas.openxmlformats.org/officeDocument/2006/customXml" ds:itemID="{3836F65B-1B07-41EE-A0E8-BC6EF3855225}">
+<ds:datastoreItem xmlns:ds="http://schemas.openxmlformats.org/officeDocument/2006/customXml" ds:itemID="{A09BF4D4-EF60-4196-BFC3-9462D607978C}">
   <ds:schemaRefs>
-    <ds:schemaRef ds:uri="http://schemas.microsoft.com/sharepoint/v3/contenttype/forms"/>
+    <ds:schemaRef ds:uri="http://schemas.microsoft.com/office/2006/metadata/contentType"/>
+    <ds:schemaRef ds:uri="http://schemas.microsoft.com/office/2006/metadata/properties/metaAttributes"/>
+    <ds:schemaRef ds:uri="http://www.w3.org/2001/XMLSchema"/>
+    <ds:schemaRef ds:uri="http://schemas.microsoft.com/office/2006/metadata/properties"/>
+    <ds:schemaRef ds:uri="4873beb7-5857-4685-be1f-d57550cc96cc"/>
+    <ds:schemaRef ds:uri="http://schemas.microsoft.com/office/2006/documentManagement/types"/>
+    <ds:schemaRef ds:uri="http://schemas.microsoft.com/office/infopath/2007/PartnerControls"/>
+    <ds:schemaRef ds:uri="http://schemas.openxmlformats.org/package/2006/metadata/core-properties"/>
+    <ds:schemaRef ds:uri="http://purl.org/dc/elements/1.1/"/>
+    <ds:schemaRef ds:uri="http://purl.org/dc/terms/"/>
+    <ds:schemaRef ds:uri="http://schemas.microsoft.com/internal/obd"/>
   </ds:schemaRefs>
 </ds:datastoreItem>
 </file>
@@ -18774,19 +18960,9 @@
 </file>
 
 <file path=customXml/itemProps3.xml><?xml version="1.0" encoding="utf-8"?>
-<ds:datastoreItem xmlns:ds="http://schemas.openxmlformats.org/officeDocument/2006/customXml" ds:itemID="{A09BF4D4-EF60-4196-BFC3-9462D607978C}">
+<ds:datastoreItem xmlns:ds="http://schemas.openxmlformats.org/officeDocument/2006/customXml" ds:itemID="{3836F65B-1B07-41EE-A0E8-BC6EF3855225}">
   <ds:schemaRefs>
-    <ds:schemaRef ds:uri="http://schemas.microsoft.com/office/2006/metadata/contentType"/>
-    <ds:schemaRef ds:uri="http://schemas.microsoft.com/office/2006/metadata/properties/metaAttributes"/>
-    <ds:schemaRef ds:uri="http://www.w3.org/2001/XMLSchema"/>
-    <ds:schemaRef ds:uri="http://schemas.microsoft.com/office/2006/metadata/properties"/>
-    <ds:schemaRef ds:uri="4873beb7-5857-4685-be1f-d57550cc96cc"/>
-    <ds:schemaRef ds:uri="http://schemas.microsoft.com/office/2006/documentManagement/types"/>
-    <ds:schemaRef ds:uri="http://schemas.microsoft.com/office/infopath/2007/PartnerControls"/>
-    <ds:schemaRef ds:uri="http://schemas.openxmlformats.org/package/2006/metadata/core-properties"/>
-    <ds:schemaRef ds:uri="http://purl.org/dc/elements/1.1/"/>
-    <ds:schemaRef ds:uri="http://purl.org/dc/terms/"/>
-    <ds:schemaRef ds:uri="http://schemas.microsoft.com/internal/obd"/>
+    <ds:schemaRef ds:uri="http://schemas.microsoft.com/sharepoint/v3/contenttype/forms"/>
   </ds:schemaRefs>
 </ds:datastoreItem>
 </file>
</xml_diff>